<commit_message>
Update Review of studies to motivate implementation and design.pptx
</commit_message>
<xml_diff>
--- a/Review of studies to motivate implementation and design.pptx
+++ b/Review of studies to motivate implementation and design.pptx
@@ -18,7 +18,9 @@
     <p:sldId id="265" r:id="rId12"/>
     <p:sldId id="268" r:id="rId13"/>
     <p:sldId id="269" r:id="rId14"/>
-    <p:sldId id="270" r:id="rId15"/>
+    <p:sldId id="271" r:id="rId15"/>
+    <p:sldId id="272" r:id="rId16"/>
+    <p:sldId id="270" r:id="rId17"/>
   </p:sldIdLst>
   <p:sldSz cx="12192000" cy="6858000"/>
   <p:notesSz cx="6858000" cy="9144000"/>
@@ -117,6 +119,11 @@
       </a:defRPr>
     </a:lvl9pPr>
   </p:defaultTextStyle>
+  <p:extLst>
+    <p:ext uri="{EFAFB233-063F-42B5-8137-9DF3F51BA10A}">
+      <p15:sldGuideLst xmlns:p15="http://schemas.microsoft.com/office/powerpoint/2012/main"/>
+    </p:ext>
+  </p:extLst>
 </p:presentation>
 </file>
 
@@ -8839,7 +8846,7 @@
           <a:p>
             <a:r>
               <a:rPr lang="en-ZA" dirty="0"/>
-              <a:t>Music Therapy for Dementia</a:t>
+              <a:t>Music Therapy for Dementia (2021)</a:t>
             </a:r>
           </a:p>
           <a:p>
@@ -8861,7 +8868,15 @@
             </a:pPr>
             <a:r>
               <a:rPr lang="en-ZA" dirty="0"/>
-              <a:t>Only place I could find that mentions specific music that stimulates dementia patients and encourages them to dance, sing and move along.</a:t>
+              <a:t>unreliable article </a:t>
+            </a:r>
+            <a:r>
+              <a:rPr lang="en-ZA"/>
+              <a:t>I found that </a:t>
+            </a:r>
+            <a:r>
+              <a:rPr lang="en-ZA" dirty="0"/>
+              <a:t>mentions specific music that stimulates dementia patients and encourages them to dance, sing and move along.</a:t>
             </a:r>
           </a:p>
           <a:p>
@@ -8984,19 +8999,13 @@
           <a:p>
             <a:r>
               <a:rPr lang="en-GB" dirty="0"/>
-              <a:t>Carers’ experience of using assistive technology for dementia care at home: a qualitative study (2020)</a:t>
+              <a:t>(1) Physical activity engagement strategies in people with mild cognitive impairment or dementia – a focus group study (2020)</a:t>
             </a:r>
           </a:p>
           <a:p>
             <a:r>
               <a:rPr lang="en-GB" dirty="0"/>
-              <a:t>Physical activity engagement strategies in people with mild cognitive impairment or dementia – a focus group study (2020)</a:t>
-            </a:r>
-          </a:p>
-          <a:p>
-            <a:r>
-              <a:rPr lang="en-GB" dirty="0"/>
-              <a:t>Behaviour patterns detection for persuasive design in nursing homes to help patients (2011)</a:t>
+              <a:t>(2) Behaviour patterns detection for persuasive design in nursing homes to help patients (2011)</a:t>
             </a:r>
             <a:endParaRPr lang="en-ZA" dirty="0"/>
           </a:p>
@@ -9037,6 +9046,268 @@
           <p:cNvPr id="2" name="Title 1">
             <a:extLst>
               <a:ext uri="{FF2B5EF4-FFF2-40B4-BE49-F238E27FC236}">
+                <a16:creationId xmlns:a16="http://schemas.microsoft.com/office/drawing/2014/main" id="{F940AF63-0EFC-1DD1-F0B1-DD1D999C4D19}"/>
+              </a:ext>
+            </a:extLst>
+          </p:cNvPr>
+          <p:cNvSpPr>
+            <a:spLocks noGrp="1"/>
+          </p:cNvSpPr>
+          <p:nvPr>
+            <p:ph type="title"/>
+          </p:nvPr>
+        </p:nvSpPr>
+        <p:spPr/>
+        <p:txBody>
+          <a:bodyPr/>
+          <a:lstStyle/>
+          <a:p>
+            <a:r>
+              <a:rPr lang="en-GB" dirty="0"/>
+              <a:t>Motivational reassurance studies</a:t>
+            </a:r>
+            <a:endParaRPr lang="en-ZA" dirty="0"/>
+          </a:p>
+        </p:txBody>
+      </p:sp>
+      <p:sp>
+        <p:nvSpPr>
+          <p:cNvPr id="3" name="Content Placeholder 2">
+            <a:extLst>
+              <a:ext uri="{FF2B5EF4-FFF2-40B4-BE49-F238E27FC236}">
+                <a16:creationId xmlns:a16="http://schemas.microsoft.com/office/drawing/2014/main" id="{097B2B9B-5519-4F71-D65B-B2D609CBA6FA}"/>
+              </a:ext>
+            </a:extLst>
+          </p:cNvPr>
+          <p:cNvSpPr>
+            <a:spLocks noGrp="1"/>
+          </p:cNvSpPr>
+          <p:nvPr>
+            <p:ph idx="1"/>
+          </p:nvPr>
+        </p:nvSpPr>
+        <p:spPr/>
+        <p:txBody>
+          <a:bodyPr/>
+          <a:lstStyle/>
+          <a:p>
+            <a:r>
+              <a:rPr lang="en-US" dirty="0"/>
+              <a:t>Self-motivation:</a:t>
+            </a:r>
+          </a:p>
+          <a:p>
+            <a:pPr lvl="1"/>
+            <a:r>
+              <a:rPr lang="en-US" dirty="0"/>
+              <a:t> Some Participant found goal setting to be a great motivator while some felt they would set themselves up to fail (1).</a:t>
+            </a:r>
+          </a:p>
+          <a:p>
+            <a:pPr lvl="1"/>
+            <a:r>
+              <a:rPr lang="en-US" dirty="0"/>
+              <a:t>Keeping these goals in mind were difficult for some with memory problems and they needed reminders for their goals (1).</a:t>
+            </a:r>
+            <a:endParaRPr lang="en-ZA" dirty="0"/>
+          </a:p>
+          <a:p>
+            <a:r>
+              <a:rPr lang="en-ZA" dirty="0"/>
+              <a:t>External motivation:</a:t>
+            </a:r>
+          </a:p>
+          <a:p>
+            <a:pPr lvl="1"/>
+            <a:r>
+              <a:rPr lang="en-US" dirty="0"/>
+              <a:t>Most patients and relatives welcomed music into their exercise with only one forgetting how to switch her audio player on (1).</a:t>
+            </a:r>
+          </a:p>
+          <a:p>
+            <a:r>
+              <a:rPr lang="en-US" dirty="0"/>
+              <a:t>The use of persuasive motivation techniques allows us to motivate people to change behavior disorders and promote healthy behavior patterns (2)</a:t>
+            </a:r>
+          </a:p>
+          <a:p>
+            <a:pPr lvl="1"/>
+            <a:r>
+              <a:rPr lang="en-ZA" dirty="0"/>
+              <a:t>Changing the attitudes of patients through persuasion and social influence instead of coercion</a:t>
+            </a:r>
+          </a:p>
+          <a:p>
+            <a:pPr marL="457200" lvl="1" indent="0">
+              <a:buNone/>
+            </a:pPr>
+            <a:endParaRPr lang="en-US" dirty="0"/>
+          </a:p>
+        </p:txBody>
+      </p:sp>
+    </p:spTree>
+    <p:extLst>
+      <p:ext uri="{BB962C8B-B14F-4D97-AF65-F5344CB8AC3E}">
+        <p14:creationId xmlns:p14="http://schemas.microsoft.com/office/powerpoint/2010/main" val="2717106173"/>
+      </p:ext>
+    </p:extLst>
+  </p:cSld>
+  <p:clrMapOvr>
+    <a:masterClrMapping/>
+  </p:clrMapOvr>
+</p:sld>
+</file>
+
+<file path=ppt/slides/slide15.xml><?xml version="1.0" encoding="utf-8"?>
+<p:sld xmlns:a="http://schemas.openxmlformats.org/drawingml/2006/main" xmlns:r="http://schemas.openxmlformats.org/officeDocument/2006/relationships" xmlns:p="http://schemas.openxmlformats.org/presentationml/2006/main">
+  <p:cSld>
+    <p:spTree>
+      <p:nvGrpSpPr>
+        <p:cNvPr id="1" name=""/>
+        <p:cNvGrpSpPr/>
+        <p:nvPr/>
+      </p:nvGrpSpPr>
+      <p:grpSpPr>
+        <a:xfrm>
+          <a:off x="0" y="0"/>
+          <a:ext cx="0" cy="0"/>
+          <a:chOff x="0" y="0"/>
+          <a:chExt cx="0" cy="0"/>
+        </a:xfrm>
+      </p:grpSpPr>
+      <p:sp>
+        <p:nvSpPr>
+          <p:cNvPr id="2" name="Title 1">
+            <a:extLst>
+              <a:ext uri="{FF2B5EF4-FFF2-40B4-BE49-F238E27FC236}">
+                <a16:creationId xmlns:a16="http://schemas.microsoft.com/office/drawing/2014/main" id="{6018922E-72B7-4EDA-1C3C-77B885D17F83}"/>
+              </a:ext>
+            </a:extLst>
+          </p:cNvPr>
+          <p:cNvSpPr>
+            <a:spLocks noGrp="1"/>
+          </p:cNvSpPr>
+          <p:nvPr>
+            <p:ph type="title"/>
+          </p:nvPr>
+        </p:nvSpPr>
+        <p:spPr/>
+        <p:txBody>
+          <a:bodyPr/>
+          <a:lstStyle/>
+          <a:p>
+            <a:r>
+              <a:rPr lang="en-GB" dirty="0"/>
+              <a:t>Motivational reassurance results</a:t>
+            </a:r>
+            <a:endParaRPr lang="en-ZA" dirty="0"/>
+          </a:p>
+        </p:txBody>
+      </p:sp>
+      <p:sp>
+        <p:nvSpPr>
+          <p:cNvPr id="3" name="Content Placeholder 2">
+            <a:extLst>
+              <a:ext uri="{FF2B5EF4-FFF2-40B4-BE49-F238E27FC236}">
+                <a16:creationId xmlns:a16="http://schemas.microsoft.com/office/drawing/2014/main" id="{C11C2A3B-E011-A9A2-C9C7-7A8DB17B565C}"/>
+              </a:ext>
+            </a:extLst>
+          </p:cNvPr>
+          <p:cNvSpPr>
+            <a:spLocks noGrp="1"/>
+          </p:cNvSpPr>
+          <p:nvPr>
+            <p:ph idx="1"/>
+          </p:nvPr>
+        </p:nvSpPr>
+        <p:spPr/>
+        <p:txBody>
+          <a:bodyPr/>
+          <a:lstStyle/>
+          <a:p>
+            <a:r>
+              <a:rPr lang="en-US" dirty="0"/>
+              <a:t>(1)</a:t>
+            </a:r>
+          </a:p>
+          <a:p>
+            <a:pPr lvl="1"/>
+            <a:r>
+              <a:rPr lang="en-US" dirty="0"/>
+              <a:t>Clinicians should use goal setting with caution as it is only preferred by some who enjoy the activities</a:t>
+            </a:r>
+          </a:p>
+          <a:p>
+            <a:pPr lvl="2"/>
+            <a:r>
+              <a:rPr lang="en-US" dirty="0"/>
+              <a:t>Thus, keeping score without them knowing and motivating them using that as reference</a:t>
+            </a:r>
+          </a:p>
+          <a:p>
+            <a:pPr lvl="2"/>
+            <a:endParaRPr lang="en-US" dirty="0"/>
+          </a:p>
+          <a:p>
+            <a:r>
+              <a:rPr lang="en-US" dirty="0"/>
+              <a:t>(2)</a:t>
+            </a:r>
+          </a:p>
+          <a:p>
+            <a:pPr lvl="1"/>
+            <a:r>
+              <a:rPr lang="en-US" dirty="0"/>
+              <a:t>Using persuasive motivation allows the patients to be more accepting of changes</a:t>
+            </a:r>
+          </a:p>
+          <a:p>
+            <a:pPr marL="914400" lvl="2" indent="0">
+              <a:buNone/>
+            </a:pPr>
+            <a:endParaRPr lang="en-US" dirty="0"/>
+          </a:p>
+          <a:p>
+            <a:pPr lvl="1"/>
+            <a:endParaRPr lang="en-ZA" dirty="0"/>
+          </a:p>
+        </p:txBody>
+      </p:sp>
+    </p:spTree>
+    <p:extLst>
+      <p:ext uri="{BB962C8B-B14F-4D97-AF65-F5344CB8AC3E}">
+        <p14:creationId xmlns:p14="http://schemas.microsoft.com/office/powerpoint/2010/main" val="1724944484"/>
+      </p:ext>
+    </p:extLst>
+  </p:cSld>
+  <p:clrMapOvr>
+    <a:masterClrMapping/>
+  </p:clrMapOvr>
+</p:sld>
+</file>
+
+<file path=ppt/slides/slide16.xml><?xml version="1.0" encoding="utf-8"?>
+<p:sld xmlns:a="http://schemas.openxmlformats.org/drawingml/2006/main" xmlns:r="http://schemas.openxmlformats.org/officeDocument/2006/relationships" xmlns:p="http://schemas.openxmlformats.org/presentationml/2006/main">
+  <p:cSld>
+    <p:spTree>
+      <p:nvGrpSpPr>
+        <p:cNvPr id="1" name=""/>
+        <p:cNvGrpSpPr/>
+        <p:nvPr/>
+      </p:nvGrpSpPr>
+      <p:grpSpPr>
+        <a:xfrm>
+          <a:off x="0" y="0"/>
+          <a:ext cx="0" cy="0"/>
+          <a:chOff x="0" y="0"/>
+          <a:chExt cx="0" cy="0"/>
+        </a:xfrm>
+      </p:grpSpPr>
+      <p:sp>
+        <p:nvSpPr>
+          <p:cNvPr id="2" name="Title 1">
+            <a:extLst>
+              <a:ext uri="{FF2B5EF4-FFF2-40B4-BE49-F238E27FC236}">
                 <a16:creationId xmlns:a16="http://schemas.microsoft.com/office/drawing/2014/main" id="{C452AB09-D50C-600E-A727-8BAE705BABCB}"/>
               </a:ext>
             </a:extLst>
@@ -9082,6 +9353,16 @@
           <a:bodyPr/>
           <a:lstStyle/>
           <a:p>
+            <a:r>
+              <a:rPr lang="en-US" dirty="0"/>
+              <a:t>Effects of viewing a preferred nature image and learning preferred music on engagement, agitation, and mental status in persons with dementia (2015)</a:t>
+            </a:r>
+          </a:p>
+          <a:p>
+            <a:r>
+              <a:rPr lang="en-US" dirty="0"/>
+              <a:t>Effects of working memory deficits on the communicative functioning of Alzheimer’s dementia patients (2003) (working to find other studies that are more recent)</a:t>
+            </a:r>
             <a:endParaRPr lang="en-ZA" dirty="0"/>
           </a:p>
         </p:txBody>

</xml_diff>